<commit_message>
feat : Update Managers
</commit_message>
<xml_diff>
--- a/기획서/UI 기획서.pptx
+++ b/기획서/UI 기획서.pptx
@@ -200,7 +200,7 @@
             <a:fld id="{04612242-2362-478A-8F46-638D8C1B64FE}" type="datetimeFigureOut">
               <a:rPr lang="ko-KR" altLang="en-US" smtClean="0"/>
               <a:pPr/>
-              <a:t>2023-02-27</a:t>
+              <a:t>2023-03-01</a:t>
             </a:fld>
             <a:endParaRPr lang="ko-KR" altLang="en-US"/>
           </a:p>
@@ -918,7 +918,7 @@
             <a:fld id="{FB30EDBD-1C2D-4C1E-B459-B60219FAB484}" type="datetimeFigureOut">
               <a:rPr lang="ko-KR" altLang="en-US" smtClean="0"/>
               <a:pPr/>
-              <a:t>2023-02-27</a:t>
+              <a:t>2023-03-01</a:t>
             </a:fld>
             <a:endParaRPr lang="ko-KR" altLang="en-US"/>
           </a:p>
@@ -1085,7 +1085,7 @@
             <a:fld id="{FB30EDBD-1C2D-4C1E-B459-B60219FAB484}" type="datetimeFigureOut">
               <a:rPr lang="ko-KR" altLang="en-US" smtClean="0"/>
               <a:pPr/>
-              <a:t>2023-02-27</a:t>
+              <a:t>2023-03-01</a:t>
             </a:fld>
             <a:endParaRPr lang="ko-KR" altLang="en-US"/>
           </a:p>
@@ -1262,7 +1262,7 @@
             <a:fld id="{FB30EDBD-1C2D-4C1E-B459-B60219FAB484}" type="datetimeFigureOut">
               <a:rPr lang="ko-KR" altLang="en-US" smtClean="0"/>
               <a:pPr/>
-              <a:t>2023-02-27</a:t>
+              <a:t>2023-03-01</a:t>
             </a:fld>
             <a:endParaRPr lang="ko-KR" altLang="en-US"/>
           </a:p>
@@ -1429,7 +1429,7 @@
             <a:fld id="{FB30EDBD-1C2D-4C1E-B459-B60219FAB484}" type="datetimeFigureOut">
               <a:rPr lang="ko-KR" altLang="en-US" smtClean="0"/>
               <a:pPr/>
-              <a:t>2023-02-27</a:t>
+              <a:t>2023-03-01</a:t>
             </a:fld>
             <a:endParaRPr lang="ko-KR" altLang="en-US"/>
           </a:p>
@@ -1672,7 +1672,7 @@
             <a:fld id="{FB30EDBD-1C2D-4C1E-B459-B60219FAB484}" type="datetimeFigureOut">
               <a:rPr lang="ko-KR" altLang="en-US" smtClean="0"/>
               <a:pPr/>
-              <a:t>2023-02-27</a:t>
+              <a:t>2023-03-01</a:t>
             </a:fld>
             <a:endParaRPr lang="ko-KR" altLang="en-US"/>
           </a:p>
@@ -1957,7 +1957,7 @@
             <a:fld id="{FB30EDBD-1C2D-4C1E-B459-B60219FAB484}" type="datetimeFigureOut">
               <a:rPr lang="ko-KR" altLang="en-US" smtClean="0"/>
               <a:pPr/>
-              <a:t>2023-02-27</a:t>
+              <a:t>2023-03-01</a:t>
             </a:fld>
             <a:endParaRPr lang="ko-KR" altLang="en-US"/>
           </a:p>
@@ -2376,7 +2376,7 @@
             <a:fld id="{FB30EDBD-1C2D-4C1E-B459-B60219FAB484}" type="datetimeFigureOut">
               <a:rPr lang="ko-KR" altLang="en-US" smtClean="0"/>
               <a:pPr/>
-              <a:t>2023-02-27</a:t>
+              <a:t>2023-03-01</a:t>
             </a:fld>
             <a:endParaRPr lang="ko-KR" altLang="en-US"/>
           </a:p>
@@ -2491,7 +2491,7 @@
             <a:fld id="{FB30EDBD-1C2D-4C1E-B459-B60219FAB484}" type="datetimeFigureOut">
               <a:rPr lang="ko-KR" altLang="en-US" smtClean="0"/>
               <a:pPr/>
-              <a:t>2023-02-27</a:t>
+              <a:t>2023-03-01</a:t>
             </a:fld>
             <a:endParaRPr lang="ko-KR" altLang="en-US"/>
           </a:p>
@@ -2583,7 +2583,7 @@
             <a:fld id="{FB30EDBD-1C2D-4C1E-B459-B60219FAB484}" type="datetimeFigureOut">
               <a:rPr lang="ko-KR" altLang="en-US" smtClean="0"/>
               <a:pPr/>
-              <a:t>2023-02-27</a:t>
+              <a:t>2023-03-01</a:t>
             </a:fld>
             <a:endParaRPr lang="ko-KR" altLang="en-US"/>
           </a:p>
@@ -2857,7 +2857,7 @@
             <a:fld id="{FB30EDBD-1C2D-4C1E-B459-B60219FAB484}" type="datetimeFigureOut">
               <a:rPr lang="ko-KR" altLang="en-US" smtClean="0"/>
               <a:pPr/>
-              <a:t>2023-02-27</a:t>
+              <a:t>2023-03-01</a:t>
             </a:fld>
             <a:endParaRPr lang="ko-KR" altLang="en-US"/>
           </a:p>
@@ -3107,7 +3107,7 @@
             <a:fld id="{FB30EDBD-1C2D-4C1E-B459-B60219FAB484}" type="datetimeFigureOut">
               <a:rPr lang="ko-KR" altLang="en-US" smtClean="0"/>
               <a:pPr/>
-              <a:t>2023-02-27</a:t>
+              <a:t>2023-03-01</a:t>
             </a:fld>
             <a:endParaRPr lang="ko-KR" altLang="en-US"/>
           </a:p>
@@ -3317,7 +3317,7 @@
             <a:fld id="{FB30EDBD-1C2D-4C1E-B459-B60219FAB484}" type="datetimeFigureOut">
               <a:rPr lang="ko-KR" altLang="en-US" smtClean="0"/>
               <a:pPr/>
-              <a:t>2023-02-27</a:t>
+              <a:t>2023-03-01</a:t>
             </a:fld>
             <a:endParaRPr lang="ko-KR" altLang="en-US"/>
           </a:p>
@@ -4613,11 +4613,7 @@
           <a:p>
             <a:r>
               <a:rPr lang="en-US" altLang="ko-KR" b="1" dirty="0" smtClean="0"/>
-              <a:t>Initializing </a:t>
-            </a:r>
-            <a:r>
-              <a:rPr lang="en-US" altLang="ko-KR" b="1" dirty="0" smtClean="0"/>
-              <a:t>Scene(1</a:t>
+              <a:t>Initializing Scene(1</a:t>
             </a:r>
             <a:r>
               <a:rPr lang="ko-KR" altLang="en-US" b="1" dirty="0" smtClean="0"/>
@@ -5992,11 +5988,7 @@
           <a:p>
             <a:r>
               <a:rPr lang="en-US" altLang="ko-KR" b="1" dirty="0" smtClean="0"/>
-              <a:t>Initializing </a:t>
-            </a:r>
-            <a:r>
-              <a:rPr lang="en-US" altLang="ko-KR" b="1" dirty="0" smtClean="0"/>
-              <a:t>Scene(2</a:t>
+              <a:t>Initializing Scene(2</a:t>
             </a:r>
             <a:r>
               <a:rPr lang="ko-KR" altLang="en-US" b="1" dirty="0" smtClean="0"/>
@@ -6931,11 +6923,7 @@
             </a:r>
             <a:r>
               <a:rPr lang="ko-KR" altLang="en-US" sz="1200" b="1" dirty="0" smtClean="0"/>
-              <a:t>아무 버튼 입력을 통해 건너 뛸 수 있도록 </a:t>
-            </a:r>
-            <a:r>
-              <a:rPr lang="ko-KR" altLang="en-US" sz="1200" b="1" dirty="0" smtClean="0"/>
-              <a:t>함</a:t>
+              <a:t>아무 버튼 입력을 통해 건너 뛸 수 있도록 함</a:t>
             </a:r>
             <a:r>
               <a:rPr lang="en-US" altLang="ko-KR" sz="1200" b="1" dirty="0" smtClean="0"/>
@@ -6947,11 +6935,7 @@
             </a:r>
             <a:r>
               <a:rPr lang="en-US" altLang="ko-KR" sz="1200" b="1" dirty="0" smtClean="0"/>
-              <a:t> </a:t>
-            </a:r>
-            <a:r>
-              <a:rPr lang="en-US" altLang="ko-KR" sz="1200" b="1" dirty="0" smtClean="0"/>
-              <a:t>- </a:t>
+              <a:t> - </a:t>
             </a:r>
             <a:r>
               <a:rPr lang="ko-KR" altLang="en-US" sz="1200" b="1" dirty="0" smtClean="0"/>
@@ -7078,7 +7062,6 @@
               <a:rPr lang="en-US" altLang="ko-KR" sz="1400" b="1" dirty="0" smtClean="0"/>
               <a:t> </a:t>
             </a:r>
-            <a:endParaRPr lang="en-US" altLang="ko-KR" sz="1400" b="1" dirty="0" smtClean="0"/>
           </a:p>
         </p:txBody>
       </p:sp>
@@ -7376,11 +7359,7 @@
             </a:r>
             <a:r>
               <a:rPr lang="ko-KR" altLang="en-US" sz="1200" b="1" dirty="0" smtClean="0"/>
-              <a:t> 실행 해제하면 </a:t>
-            </a:r>
-            <a:r>
-              <a:rPr lang="ko-KR" altLang="en-US" sz="1200" b="1" dirty="0" smtClean="0"/>
-              <a:t>됨</a:t>
+              <a:t> 실행 해제하면 됨</a:t>
             </a:r>
             <a:endParaRPr lang="en-US" altLang="ko-KR" sz="1200" b="1" dirty="0" smtClean="0"/>
           </a:p>
@@ -7851,23 +7830,11 @@
             </a:r>
             <a:r>
               <a:rPr lang="ko-KR" altLang="en-US" sz="1200" b="1" dirty="0" smtClean="0"/>
-              <a:t>페이지</a:t>
-            </a:r>
-            <a:r>
-              <a:rPr lang="ko-KR" altLang="en-US" sz="1200" b="1" dirty="0" smtClean="0"/>
-              <a:t>는</a:t>
-            </a:r>
-            <a:r>
-              <a:rPr lang="ko-KR" altLang="en-US" sz="1200" b="1" dirty="0" smtClean="0"/>
-              <a:t> 연출 이후 </a:t>
+              <a:t>페이지는 연출 이후 </a:t>
             </a:r>
             <a:r>
               <a:rPr lang="en-US" altLang="ko-KR" sz="1200" b="1" dirty="0" smtClean="0"/>
-              <a:t>Main </a:t>
-            </a:r>
-            <a:r>
-              <a:rPr lang="en-US" altLang="ko-KR" sz="1200" b="1" dirty="0" smtClean="0"/>
-              <a:t>Scene</a:t>
+              <a:t>Main Scene</a:t>
             </a:r>
             <a:r>
               <a:rPr lang="ko-KR" altLang="en-US" sz="1200" b="1" dirty="0" smtClean="0"/>
@@ -8154,11 +8121,7 @@
             <a:pPr algn="ctr"/>
             <a:r>
               <a:rPr lang="en-US" altLang="ko-KR" sz="1200" b="1" dirty="0" smtClean="0"/>
-              <a:t>New </a:t>
-            </a:r>
-            <a:r>
-              <a:rPr lang="en-US" altLang="ko-KR" sz="1200" b="1" dirty="0" smtClean="0"/>
-              <a:t>Game</a:t>
+              <a:t>New Game</a:t>
             </a:r>
           </a:p>
           <a:p>
@@ -8174,7 +8137,6 @@
               <a:rPr lang="en-US" altLang="ko-KR" sz="1200" b="1" dirty="0" smtClean="0"/>
               <a:t>Credit</a:t>
             </a:r>
-            <a:endParaRPr lang="en-US" altLang="ko-KR" sz="1200" b="1" dirty="0" smtClean="0"/>
           </a:p>
           <a:p>
             <a:pPr algn="ctr"/>
@@ -8390,31 +8352,19 @@
             </a:r>
             <a:r>
               <a:rPr lang="ko-KR" altLang="en-US" sz="1200" b="1" dirty="0" smtClean="0"/>
-              <a:t> </a:t>
+              <a:t> 이동</a:t>
+            </a:r>
+            <a:endParaRPr lang="en-US" altLang="ko-KR" sz="1200" b="1" dirty="0" smtClean="0"/>
+          </a:p>
+          <a:p>
+            <a:pPr algn="ctr"/>
+            <a:r>
+              <a:rPr lang="en-US" altLang="ko-KR" sz="1200" b="1" dirty="0" smtClean="0"/>
+              <a:t>Option : </a:t>
             </a:r>
             <a:r>
               <a:rPr lang="ko-KR" altLang="en-US" sz="1200" b="1" dirty="0" smtClean="0"/>
-              <a:t>이동</a:t>
-            </a:r>
-            <a:endParaRPr lang="en-US" altLang="ko-KR" sz="1200" b="1" dirty="0" smtClean="0"/>
-          </a:p>
-          <a:p>
-            <a:pPr algn="ctr"/>
-            <a:r>
-              <a:rPr lang="en-US" altLang="ko-KR" sz="1200" b="1" dirty="0" smtClean="0"/>
-              <a:t>Option </a:t>
-            </a:r>
-            <a:r>
-              <a:rPr lang="en-US" altLang="ko-KR" sz="1200" b="1" dirty="0" smtClean="0"/>
-              <a:t>: </a:t>
-            </a:r>
-            <a:r>
-              <a:rPr lang="ko-KR" altLang="en-US" sz="1200" b="1" dirty="0" smtClean="0"/>
-              <a:t>별도의 옵션 창을 </a:t>
-            </a:r>
-            <a:r>
-              <a:rPr lang="ko-KR" altLang="en-US" sz="1200" b="1" dirty="0" smtClean="0"/>
-              <a:t>띄움</a:t>
+              <a:t>별도의 옵션 창을 띄움</a:t>
             </a:r>
             <a:endParaRPr lang="en-US" altLang="ko-KR" sz="1200" b="1" dirty="0" smtClean="0"/>
           </a:p>
@@ -8458,11 +8408,7 @@
             </a:r>
             <a:r>
               <a:rPr lang="ko-KR" altLang="en-US" sz="1200" b="1" dirty="0" smtClean="0"/>
-              <a:t>데이터 저장 후 게임 </a:t>
-            </a:r>
-            <a:r>
-              <a:rPr lang="ko-KR" altLang="en-US" sz="1200" b="1" dirty="0" smtClean="0"/>
-              <a:t>종료</a:t>
+              <a:t>데이터 저장 후 게임 종료</a:t>
             </a:r>
             <a:endParaRPr lang="en-US" altLang="ko-KR" sz="1200" b="1" dirty="0" smtClean="0"/>
           </a:p>
@@ -8871,15 +8817,7 @@
             <a:pPr algn="ctr"/>
             <a:r>
               <a:rPr lang="en-US" altLang="ko-KR" sz="1200" b="1" dirty="0" smtClean="0"/>
-              <a:t>Sound </a:t>
-            </a:r>
-            <a:r>
-              <a:rPr lang="en-US" altLang="ko-KR" sz="1200" b="1" dirty="0" smtClean="0"/>
-              <a:t>: </a:t>
-            </a:r>
-            <a:r>
-              <a:rPr lang="en-US" altLang="ko-KR" sz="1200" b="1" dirty="0" smtClean="0"/>
-              <a:t>BGM, </a:t>
+              <a:t>Sound : BGM, </a:t>
             </a:r>
             <a:r>
               <a:rPr lang="ko-KR" altLang="en-US" sz="1200" b="1" dirty="0" smtClean="0"/>
@@ -8897,7 +8835,6 @@
               <a:rPr lang="en-US" altLang="ko-KR" sz="1200" b="1" dirty="0" smtClean="0"/>
               <a:t>)</a:t>
             </a:r>
-            <a:endParaRPr lang="en-US" altLang="ko-KR" sz="1200" b="1" dirty="0" smtClean="0"/>
           </a:p>
           <a:p>
             <a:pPr algn="ctr"/>
@@ -8942,11 +8879,7 @@
             <a:pPr algn="ctr"/>
             <a:r>
               <a:rPr lang="en-US" altLang="ko-KR" sz="1200" b="1" dirty="0" smtClean="0"/>
-              <a:t> </a:t>
-            </a:r>
-            <a:r>
-              <a:rPr lang="en-US" altLang="ko-KR" sz="1200" b="1" dirty="0" smtClean="0"/>
-              <a:t>X : </a:t>
+              <a:t> X : </a:t>
             </a:r>
             <a:r>
               <a:rPr lang="ko-KR" altLang="en-US" sz="1200" b="1" dirty="0" smtClean="0"/>
@@ -9103,7 +9036,6 @@
               <a:rPr lang="en-US" altLang="ko-KR" sz="1200" b="1" dirty="0" smtClean="0"/>
               <a:t> </a:t>
             </a:r>
-            <a:endParaRPr lang="en-US" altLang="ko-KR" sz="1200" b="1" dirty="0" smtClean="0"/>
           </a:p>
           <a:p>
             <a:pPr algn="ctr"/>
@@ -9268,11 +9200,11 @@
           <a:p>
             <a:r>
               <a:rPr lang="en-US" altLang="ko-KR" b="1" dirty="0" smtClean="0"/>
-              <a:t>Play </a:t>
-            </a:r>
-            <a:r>
-              <a:rPr lang="en-US" altLang="ko-KR" b="1" dirty="0" smtClean="0"/>
-              <a:t>Scene - Option</a:t>
+              <a:t>Play Scene – Option</a:t>
+            </a:r>
+            <a:r>
+              <a:rPr lang="ko-KR" altLang="en-US" b="1" dirty="0" smtClean="0"/>
+              <a:t>창</a:t>
             </a:r>
             <a:endParaRPr lang="ko-KR" altLang="en-US" b="1" dirty="0"/>
           </a:p>

</xml_diff>